<commit_message>
cambios en el modelado de la óptica
</commit_message>
<xml_diff>
--- a/HT-5/Optica BAC-07-Estructura del negocio.pptx
+++ b/HT-5/Optica BAC-07-Estructura del negocio.pptx
@@ -213,7 +213,7 @@
           <a:p>
             <a:fld id="{C84E95E0-43A6-4D53-BDBE-E8A6E9BC4F1E}" type="datetimeFigureOut">
               <a:rPr lang="es-ES" smtClean="0"/>
-              <a:t>6/9/22</a:t>
+              <a:t>10/9/22</a:t>
             </a:fld>
             <a:endParaRPr lang="es-ES"/>
           </a:p>
@@ -1909,7 +1909,7 @@
           <p:nvPr>
             <p:extLst>
               <p:ext uri="{D42A27DB-BD31-4B8C-83A1-F6EECF244321}">
-                <p14:modId xmlns:p14="http://schemas.microsoft.com/office/powerpoint/2010/main" val="1851806410"/>
+                <p14:modId xmlns:p14="http://schemas.microsoft.com/office/powerpoint/2010/main" val="1022042101"/>
               </p:ext>
             </p:extLst>
           </p:nvPr>
@@ -2039,7 +2039,7 @@
                           <a:latin typeface="Arial" panose="020B0604020202020204" pitchFamily="34" charset="0"/>
                           <a:cs typeface="Arial" panose="020B0604020202020204" pitchFamily="34" charset="0"/>
                         </a:rPr>
-                        <a:t>Fecha: 5-9-22</a:t>
+                        <a:t>Fecha: 10-9-22</a:t>
                       </a:r>
                     </a:p>
                   </a:txBody>
@@ -2069,8 +2069,8 @@
         </p:nvSpPr>
         <p:spPr>
           <a:xfrm>
-            <a:off x="3903192" y="1540402"/>
-            <a:ext cx="3381832" cy="3186857"/>
+            <a:off x="3936218" y="1540402"/>
+            <a:ext cx="3348805" cy="3186857"/>
           </a:xfrm>
           <a:prstGeom prst="rect">
             <a:avLst/>
@@ -2410,100 +2410,6 @@
           </a:fontRef>
         </p:style>
       </p:cxnSp>
-      <p:cxnSp>
-        <p:nvCxnSpPr>
-          <p:cNvPr id="39" name="20 Conector recto">
-            <a:extLst>
-              <a:ext uri="{FF2B5EF4-FFF2-40B4-BE49-F238E27FC236}">
-                <a16:creationId xmlns:a16="http://schemas.microsoft.com/office/drawing/2014/main" id="{2F8051A0-EA10-1744-8DD0-4AD3BD51D09A}"/>
-              </a:ext>
-            </a:extLst>
-          </p:cNvPr>
-          <p:cNvCxnSpPr>
-            <a:cxnSpLocks/>
-            <a:stCxn id="5" idx="3"/>
-            <a:endCxn id="10" idx="1"/>
-          </p:cNvCxnSpPr>
-          <p:nvPr/>
-        </p:nvCxnSpPr>
-        <p:spPr>
-          <a:xfrm>
-            <a:off x="5240024" y="3466240"/>
-            <a:ext cx="697775" cy="8414"/>
-          </a:xfrm>
-          <a:prstGeom prst="line">
-            <a:avLst/>
-          </a:prstGeom>
-          <a:solidFill>
-            <a:schemeClr val="bg1"/>
-          </a:solidFill>
-          <a:ln w="12700" cap="flat">
-            <a:solidFill>
-              <a:schemeClr val="tx1"/>
-            </a:solidFill>
-            <a:headEnd type="oval" w="sm" len="sm"/>
-            <a:tailEnd type="oval" w="sm" len="sm"/>
-          </a:ln>
-        </p:spPr>
-        <p:style>
-          <a:lnRef idx="2">
-            <a:schemeClr val="accent1">
-              <a:shade val="50000"/>
-            </a:schemeClr>
-          </a:lnRef>
-          <a:fillRef idx="1">
-            <a:schemeClr val="accent1"/>
-          </a:fillRef>
-          <a:effectRef idx="0">
-            <a:schemeClr val="accent1"/>
-          </a:effectRef>
-          <a:fontRef idx="minor">
-            <a:schemeClr val="lt1"/>
-          </a:fontRef>
-        </p:style>
-      </p:cxnSp>
-      <p:sp>
-        <p:nvSpPr>
-          <p:cNvPr id="40" name="21 CuadroTexto">
-            <a:extLst>
-              <a:ext uri="{FF2B5EF4-FFF2-40B4-BE49-F238E27FC236}">
-                <a16:creationId xmlns:a16="http://schemas.microsoft.com/office/drawing/2014/main" id="{0850C348-FB90-F749-81B9-D8F02E8750C8}"/>
-              </a:ext>
-            </a:extLst>
-          </p:cNvPr>
-          <p:cNvSpPr txBox="1"/>
-          <p:nvPr/>
-        </p:nvSpPr>
-        <p:spPr>
-          <a:xfrm>
-            <a:off x="5402012" y="3197654"/>
-            <a:ext cx="364202" cy="276999"/>
-          </a:xfrm>
-          <a:prstGeom prst="rect">
-            <a:avLst/>
-          </a:prstGeom>
-          <a:noFill/>
-        </p:spPr>
-        <p:txBody>
-          <a:bodyPr wrap="none" rtlCol="0">
-            <a:spAutoFit/>
-          </a:bodyPr>
-          <a:lstStyle/>
-          <a:p>
-            <a:r>
-              <a:rPr lang="es-MX" sz="1200" dirty="0">
-                <a:latin typeface="Arial" panose="020B0604020202020204" pitchFamily="34" charset="0"/>
-                <a:cs typeface="Arial" panose="020B0604020202020204" pitchFamily="34" charset="0"/>
-              </a:rPr>
-              <a:t>T1</a:t>
-            </a:r>
-            <a:endParaRPr lang="es-CO" sz="1200" dirty="0">
-              <a:latin typeface="Arial" panose="020B0604020202020204" pitchFamily="34" charset="0"/>
-              <a:cs typeface="Arial" panose="020B0604020202020204" pitchFamily="34" charset="0"/>
-            </a:endParaRPr>
-          </a:p>
-        </p:txBody>
-      </p:sp>
       <p:sp>
         <p:nvSpPr>
           <p:cNvPr id="41" name="47 Rectángulo">
@@ -2562,7 +2468,7 @@
                 <a:latin typeface="Arial" panose="020B0604020202020204" pitchFamily="34" charset="0"/>
                 <a:cs typeface="Arial" panose="020B0604020202020204" pitchFamily="34" charset="0"/>
               </a:rPr>
-              <a:t>Proveedor lentes</a:t>
+              <a:t>Proveedor</a:t>
             </a:r>
             <a:endParaRPr lang="es-CO" sz="1400" dirty="0">
               <a:solidFill>
@@ -2632,7 +2538,7 @@
                 <a:latin typeface="Arial" panose="020B0604020202020204" pitchFamily="34" charset="0"/>
                 <a:cs typeface="Arial" panose="020B0604020202020204" pitchFamily="34" charset="0"/>
               </a:rPr>
-              <a:t>Proveedor monturas</a:t>
+              <a:t>Laboratorio</a:t>
             </a:r>
           </a:p>
         </p:txBody>
@@ -2992,7 +2898,7 @@
         </p:nvSpPr>
         <p:spPr>
           <a:xfrm>
-            <a:off x="4149824" y="3050025"/>
+            <a:off x="5067376" y="3474654"/>
             <a:ext cx="1090200" cy="832429"/>
           </a:xfrm>
           <a:prstGeom prst="rect">
@@ -3036,70 +2942,7 @@
                 <a:latin typeface="Arial" panose="020B0604020202020204" pitchFamily="34" charset="0"/>
                 <a:cs typeface="Arial" panose="020B0604020202020204" pitchFamily="34" charset="0"/>
               </a:rPr>
-              <a:t>Montura</a:t>
-            </a:r>
-          </a:p>
-        </p:txBody>
-      </p:sp>
-      <p:sp>
-        <p:nvSpPr>
-          <p:cNvPr id="10" name="47 Rectángulo">
-            <a:extLst>
-              <a:ext uri="{FF2B5EF4-FFF2-40B4-BE49-F238E27FC236}">
-                <a16:creationId xmlns:a16="http://schemas.microsoft.com/office/drawing/2014/main" id="{9EDD96F8-2720-D4B3-6DDD-69F9546C0A84}"/>
-              </a:ext>
-            </a:extLst>
-          </p:cNvPr>
-          <p:cNvSpPr/>
-          <p:nvPr/>
-        </p:nvSpPr>
-        <p:spPr>
-          <a:xfrm>
-            <a:off x="5937799" y="3058439"/>
-            <a:ext cx="1090200" cy="832429"/>
-          </a:xfrm>
-          <a:prstGeom prst="rect">
-            <a:avLst/>
-          </a:prstGeom>
-          <a:solidFill>
-            <a:schemeClr val="bg1"/>
-          </a:solidFill>
-          <a:ln w="12700">
-            <a:solidFill>
-              <a:schemeClr val="tx1"/>
-            </a:solidFill>
-          </a:ln>
-        </p:spPr>
-        <p:style>
-          <a:lnRef idx="2">
-            <a:schemeClr val="accent1">
-              <a:shade val="50000"/>
-            </a:schemeClr>
-          </a:lnRef>
-          <a:fillRef idx="1">
-            <a:schemeClr val="accent1"/>
-          </a:fillRef>
-          <a:effectRef idx="0">
-            <a:schemeClr val="accent1"/>
-          </a:effectRef>
-          <a:fontRef idx="minor">
-            <a:schemeClr val="lt1"/>
-          </a:fontRef>
-        </p:style>
-        <p:txBody>
-          <a:bodyPr vert="horz" lIns="36000" rIns="36000" rtlCol="0" anchor="ctr"/>
-          <a:lstStyle/>
-          <a:p>
-            <a:pPr algn="ctr"/>
-            <a:r>
-              <a:rPr lang="es-CO" sz="1400" dirty="0">
-                <a:solidFill>
-                  <a:schemeClr val="tx1"/>
-                </a:solidFill>
-                <a:latin typeface="Arial" panose="020B0604020202020204" pitchFamily="34" charset="0"/>
-                <a:cs typeface="Arial" panose="020B0604020202020204" pitchFamily="34" charset="0"/>
-              </a:rPr>
-              <a:t>Montura con lentes</a:t>
+              <a:t>Bodega</a:t>
             </a:r>
           </a:p>
         </p:txBody>
@@ -3414,6 +3257,163 @@
                 <a:cs typeface="Arial" panose="020B0604020202020204" pitchFamily="34" charset="0"/>
               </a:rPr>
               <a:t>D1</a:t>
+            </a:r>
+            <a:endParaRPr lang="es-CO" sz="1200" dirty="0">
+              <a:latin typeface="Arial" panose="020B0604020202020204" pitchFamily="34" charset="0"/>
+              <a:cs typeface="Arial" panose="020B0604020202020204" pitchFamily="34" charset="0"/>
+            </a:endParaRPr>
+          </a:p>
+        </p:txBody>
+      </p:sp>
+      <p:sp>
+        <p:nvSpPr>
+          <p:cNvPr id="2" name="47 Rectángulo">
+            <a:extLst>
+              <a:ext uri="{FF2B5EF4-FFF2-40B4-BE49-F238E27FC236}">
+                <a16:creationId xmlns:a16="http://schemas.microsoft.com/office/drawing/2014/main" id="{858786E8-0F2A-050E-8518-3F0AFE71CA9C}"/>
+              </a:ext>
+            </a:extLst>
+          </p:cNvPr>
+          <p:cNvSpPr/>
+          <p:nvPr/>
+        </p:nvSpPr>
+        <p:spPr>
+          <a:xfrm>
+            <a:off x="5065520" y="2151763"/>
+            <a:ext cx="1090200" cy="832429"/>
+          </a:xfrm>
+          <a:prstGeom prst="rect">
+            <a:avLst/>
+          </a:prstGeom>
+          <a:solidFill>
+            <a:schemeClr val="bg1"/>
+          </a:solidFill>
+          <a:ln w="12700">
+            <a:solidFill>
+              <a:schemeClr val="tx1"/>
+            </a:solidFill>
+          </a:ln>
+        </p:spPr>
+        <p:style>
+          <a:lnRef idx="2">
+            <a:schemeClr val="accent1">
+              <a:shade val="50000"/>
+            </a:schemeClr>
+          </a:lnRef>
+          <a:fillRef idx="1">
+            <a:schemeClr val="accent1"/>
+          </a:fillRef>
+          <a:effectRef idx="0">
+            <a:schemeClr val="accent1"/>
+          </a:effectRef>
+          <a:fontRef idx="minor">
+            <a:schemeClr val="lt1"/>
+          </a:fontRef>
+        </p:style>
+        <p:txBody>
+          <a:bodyPr vert="horz" lIns="36000" rIns="36000" rtlCol="0" anchor="ctr"/>
+          <a:lstStyle/>
+          <a:p>
+            <a:pPr algn="ctr"/>
+            <a:r>
+              <a:rPr lang="es-CO" sz="1400" dirty="0">
+                <a:solidFill>
+                  <a:schemeClr val="tx1"/>
+                </a:solidFill>
+                <a:latin typeface="Arial" panose="020B0604020202020204" pitchFamily="34" charset="0"/>
+                <a:cs typeface="Arial" panose="020B0604020202020204" pitchFamily="34" charset="0"/>
+              </a:rPr>
+              <a:t>Mostrador</a:t>
+            </a:r>
+          </a:p>
+        </p:txBody>
+      </p:sp>
+      <p:cxnSp>
+        <p:nvCxnSpPr>
+          <p:cNvPr id="3" name="10 Conector recto">
+            <a:extLst>
+              <a:ext uri="{FF2B5EF4-FFF2-40B4-BE49-F238E27FC236}">
+                <a16:creationId xmlns:a16="http://schemas.microsoft.com/office/drawing/2014/main" id="{C3DB6384-5069-C101-C822-EA0571A97077}"/>
+              </a:ext>
+            </a:extLst>
+          </p:cNvPr>
+          <p:cNvCxnSpPr>
+            <a:cxnSpLocks/>
+            <a:stCxn id="2" idx="2"/>
+            <a:endCxn id="5" idx="0"/>
+          </p:cNvCxnSpPr>
+          <p:nvPr/>
+        </p:nvCxnSpPr>
+        <p:spPr>
+          <a:xfrm>
+            <a:off x="5610620" y="2984192"/>
+            <a:ext cx="1856" cy="490462"/>
+          </a:xfrm>
+          <a:prstGeom prst="line">
+            <a:avLst/>
+          </a:prstGeom>
+          <a:solidFill>
+            <a:schemeClr val="bg1"/>
+          </a:solidFill>
+          <a:ln w="12700" cap="flat">
+            <a:solidFill>
+              <a:schemeClr val="tx1"/>
+            </a:solidFill>
+            <a:headEnd type="oval" w="sm" len="sm"/>
+            <a:tailEnd type="oval" w="sm" len="sm"/>
+          </a:ln>
+        </p:spPr>
+        <p:style>
+          <a:lnRef idx="2">
+            <a:schemeClr val="accent1">
+              <a:shade val="50000"/>
+            </a:schemeClr>
+          </a:lnRef>
+          <a:fillRef idx="1">
+            <a:schemeClr val="accent1"/>
+          </a:fillRef>
+          <a:effectRef idx="0">
+            <a:schemeClr val="accent1"/>
+          </a:effectRef>
+          <a:fontRef idx="minor">
+            <a:schemeClr val="lt1"/>
+          </a:fontRef>
+        </p:style>
+      </p:cxnSp>
+      <p:sp>
+        <p:nvSpPr>
+          <p:cNvPr id="9" name="12 CuadroTexto">
+            <a:extLst>
+              <a:ext uri="{FF2B5EF4-FFF2-40B4-BE49-F238E27FC236}">
+                <a16:creationId xmlns:a16="http://schemas.microsoft.com/office/drawing/2014/main" id="{9A85E3A1-FBD3-CCA1-89AD-D054B27F5FEB}"/>
+              </a:ext>
+            </a:extLst>
+          </p:cNvPr>
+          <p:cNvSpPr txBox="1"/>
+          <p:nvPr/>
+        </p:nvSpPr>
+        <p:spPr>
+          <a:xfrm>
+            <a:off x="5610620" y="3090673"/>
+            <a:ext cx="380232" cy="276999"/>
+          </a:xfrm>
+          <a:prstGeom prst="rect">
+            <a:avLst/>
+          </a:prstGeom>
+          <a:noFill/>
+        </p:spPr>
+        <p:txBody>
+          <a:bodyPr wrap="none" rtlCol="0">
+            <a:spAutoFit/>
+          </a:bodyPr>
+          <a:lstStyle/>
+          <a:p>
+            <a:r>
+              <a:rPr lang="es-MX" sz="1200" dirty="0">
+                <a:latin typeface="Arial" panose="020B0604020202020204" pitchFamily="34" charset="0"/>
+                <a:cs typeface="Arial" panose="020B0604020202020204" pitchFamily="34" charset="0"/>
+              </a:rPr>
+              <a:t>D2</a:t>
             </a:r>
             <a:endParaRPr lang="es-CO" sz="1200" dirty="0">
               <a:latin typeface="Arial" panose="020B0604020202020204" pitchFamily="34" charset="0"/>

</xml_diff>